<commit_message>
updated with sept :qupdated with 2019 update 2019 updates
</commit_message>
<xml_diff>
--- a/VisualStudio2019Launch_Containers FINAL.pptx
+++ b/VisualStudio2019Launch_Containers FINAL.pptx
@@ -6,10 +6,10 @@
     <p:sldMasterId id="2147484642" r:id="rId5"/>
   </p:sldMasterIdLst>
   <p:notesMasterIdLst>
-    <p:notesMasterId r:id="rId15"/>
+    <p:notesMasterId r:id="rId18"/>
   </p:notesMasterIdLst>
   <p:handoutMasterIdLst>
-    <p:handoutMasterId r:id="rId16"/>
+    <p:handoutMasterId r:id="rId19"/>
   </p:handoutMasterIdLst>
   <p:sldIdLst>
     <p:sldId id="1720" r:id="rId6"/>
@@ -17,10 +17,13 @@
     <p:sldId id="1860" r:id="rId8"/>
     <p:sldId id="1857" r:id="rId9"/>
     <p:sldId id="1858" r:id="rId10"/>
-    <p:sldId id="1861" r:id="rId11"/>
-    <p:sldId id="1527" r:id="rId12"/>
-    <p:sldId id="1859" r:id="rId13"/>
-    <p:sldId id="1532" r:id="rId14"/>
+    <p:sldId id="1863" r:id="rId11"/>
+    <p:sldId id="1865" r:id="rId12"/>
+    <p:sldId id="1864" r:id="rId13"/>
+    <p:sldId id="1861" r:id="rId14"/>
+    <p:sldId id="1527" r:id="rId15"/>
+    <p:sldId id="1859" r:id="rId16"/>
+    <p:sldId id="1532" r:id="rId17"/>
   </p:sldIdLst>
   <p:sldSz cx="12192000" cy="6858000"/>
   <p:notesSz cx="6858000" cy="9144000"/>
@@ -248,7 +251,7 @@
               <a:rPr lang="en-US" smtClean="0">
                 <a:latin typeface="Segoe UI" pitchFamily="34" charset="0"/>
               </a:rPr>
-              <a:t>4/5/2019 10:25 PM</a:t>
+              <a:t>9/20/2019 10:37 AM</a:t>
             </a:fld>
             <a:endParaRPr lang="en-US" dirty="0">
               <a:latin typeface="Segoe UI" pitchFamily="34" charset="0"/>
@@ -526,7 +529,7 @@
           <a:p>
             <a:fld id="{386CE63F-9E7F-4C04-9D0D-FCA25A8E9E86}" type="datetime8">
               <a:rPr lang="en-US" smtClean="0"/>
-              <a:t>4/5/2019 10:25 PM</a:t>
+              <a:t>9/20/2019 10:36 AM</a:t>
             </a:fld>
             <a:endParaRPr lang="en-US" dirty="0"/>
           </a:p>
@@ -893,7 +896,7 @@
           <a:p>
             <a:fld id="{62072DC8-D49D-432C-9D46-A7718B5F5490}" type="datetime8">
               <a:rPr lang="en-US" smtClean="0"/>
-              <a:t>4/5/2019 10:25 PM</a:t>
+              <a:t>9/20/2019 10:36 AM</a:t>
             </a:fld>
             <a:endParaRPr lang="en-US" dirty="0"/>
           </a:p>
@@ -1027,7 +1030,7 @@
           <a:p>
             <a:fld id="{06C18626-F474-479E-937A-543AA55347B1}" type="datetime8">
               <a:rPr lang="en-US" smtClean="0"/>
-              <a:t>4/5/2019 10:25 PM</a:t>
+              <a:t>9/20/2019 10:36 AM</a:t>
             </a:fld>
             <a:endParaRPr lang="en-US" dirty="0"/>
           </a:p>
@@ -1226,7 +1229,7 @@
           <a:p>
             <a:fld id="{06C18626-F474-479E-937A-543AA55347B1}" type="datetime8">
               <a:rPr lang="en-US" smtClean="0"/>
-              <a:t>4/5/2019 10:25 PM</a:t>
+              <a:t>9/20/2019 10:36 AM</a:t>
             </a:fld>
             <a:endParaRPr lang="en-US" dirty="0"/>
           </a:p>
@@ -1425,7 +1428,7 @@
           <a:p>
             <a:fld id="{06C18626-F474-479E-937A-543AA55347B1}" type="datetime8">
               <a:rPr lang="en-US" smtClean="0"/>
-              <a:t>4/5/2019 10:25 PM</a:t>
+              <a:t>9/20/2019 10:36 AM</a:t>
             </a:fld>
             <a:endParaRPr lang="en-US" dirty="0"/>
           </a:p>
@@ -1624,7 +1627,7 @@
           <a:p>
             <a:fld id="{06C18626-F474-479E-937A-543AA55347B1}" type="datetime8">
               <a:rPr lang="en-US" smtClean="0"/>
-              <a:t>4/5/2019 10:25 PM</a:t>
+              <a:t>9/20/2019 10:36 AM</a:t>
             </a:fld>
             <a:endParaRPr lang="en-US" dirty="0"/>
           </a:p>
@@ -1656,7 +1659,7 @@
             <a:fld id="{8B263312-38AA-4E1E-B2B5-0F8F122B24FE}" type="slidenum">
               <a:rPr lang="en-US" smtClean="0"/>
               <a:pPr/>
-              <a:t>6</a:t>
+              <a:t>9</a:t>
             </a:fld>
             <a:endParaRPr lang="en-US" dirty="0"/>
           </a:p>
@@ -1854,7 +1857,7 @@
           <a:p>
             <a:fld id="{B16574EE-8191-4BCC-ABE6-D00A4F4D7690}" type="datetime8">
               <a:rPr lang="en-US" smtClean="0"/>
-              <a:t>4/5/2019 10:25 PM</a:t>
+              <a:t>9/20/2019 10:36 AM</a:t>
             </a:fld>
             <a:endParaRPr lang="en-US" dirty="0"/>
           </a:p>
@@ -1878,7 +1881,7 @@
             <a:fld id="{B4008EB6-D09E-4580-8CD6-DDB14511944F}" type="slidenum">
               <a:rPr lang="en-US" smtClean="0"/>
               <a:pPr/>
-              <a:t>7</a:t>
+              <a:t>10</a:t>
             </a:fld>
             <a:endParaRPr lang="en-US" dirty="0"/>
           </a:p>
@@ -1988,7 +1991,7 @@
           <a:p>
             <a:fld id="{06C18626-F474-479E-937A-543AA55347B1}" type="datetime8">
               <a:rPr lang="en-US" smtClean="0"/>
-              <a:t>4/5/2019 10:25 PM</a:t>
+              <a:t>9/20/2019 10:36 AM</a:t>
             </a:fld>
             <a:endParaRPr lang="en-US" dirty="0"/>
           </a:p>
@@ -2020,7 +2023,7 @@
             <a:fld id="{8B263312-38AA-4E1E-B2B5-0F8F122B24FE}" type="slidenum">
               <a:rPr lang="en-US" smtClean="0"/>
               <a:pPr/>
-              <a:t>8</a:t>
+              <a:t>11</a:t>
             </a:fld>
             <a:endParaRPr lang="en-US" dirty="0"/>
           </a:p>
@@ -2203,7 +2206,7 @@
                   <a:prstClr val="black"/>
                 </a:solidFill>
               </a:rPr>
-              <a:t>4/5/2019 10:25 PM</a:t>
+              <a:t>9/20/2019 10:36 AM</a:t>
             </a:fld>
             <a:endParaRPr lang="en-US" dirty="0">
               <a:solidFill>
@@ -2235,7 +2238,7 @@
                 </a:solidFill>
               </a:rPr>
               <a:pPr/>
-              <a:t>9</a:t>
+              <a:t>12</a:t>
             </a:fld>
             <a:endParaRPr lang="en-US" dirty="0">
               <a:solidFill>
@@ -2581,7 +2584,7 @@
       </p:transition>
     </mc:Fallback>
   </mc:AlternateContent>
-  <p:extLst mod="1">
+  <p:extLst>
     <p:ext uri="{DCECCB84-F9BA-43D5-87BE-67443E8EF086}">
       <p15:sldGuideLst xmlns:p15="http://schemas.microsoft.com/office/powerpoint/2012/main">
         <p15:guide id="1" orient="horz" pos="2228">
@@ -2856,7 +2859,7 @@
       </p:transition>
     </mc:Fallback>
   </mc:AlternateContent>
-  <p:extLst mod="1">
+  <p:extLst>
     <p:ext uri="{DCECCB84-F9BA-43D5-87BE-67443E8EF086}">
       <p15:sldGuideLst xmlns:p15="http://schemas.microsoft.com/office/powerpoint/2012/main">
         <p15:guide id="2" orient="horz" pos="2496">
@@ -3133,7 +3136,7 @@
       </p:transition>
     </mc:Fallback>
   </mc:AlternateContent>
-  <p:extLst mod="1">
+  <p:extLst>
     <p:ext uri="{DCECCB84-F9BA-43D5-87BE-67443E8EF086}">
       <p15:sldGuideLst xmlns:p15="http://schemas.microsoft.com/office/powerpoint/2012/main">
         <p15:guide id="2" orient="horz" pos="2496">
@@ -3410,7 +3413,7 @@
       </p:transition>
     </mc:Fallback>
   </mc:AlternateContent>
-  <p:extLst mod="1">
+  <p:extLst>
     <p:ext uri="{DCECCB84-F9BA-43D5-87BE-67443E8EF086}">
       <p15:sldGuideLst xmlns:p15="http://schemas.microsoft.com/office/powerpoint/2012/main">
         <p15:guide id="2" orient="horz" pos="2496">
@@ -3670,7 +3673,7 @@
       </p:transition>
     </mc:Fallback>
   </mc:AlternateContent>
-  <p:extLst mod="1">
+  <p:extLst>
     <p:ext uri="{DCECCB84-F9BA-43D5-87BE-67443E8EF086}">
       <p15:sldGuideLst xmlns:p15="http://schemas.microsoft.com/office/powerpoint/2012/main">
         <p15:guide id="1" orient="horz" pos="2228" userDrawn="1">
@@ -3925,7 +3928,7 @@
       </p:transition>
     </mc:Fallback>
   </mc:AlternateContent>
-  <p:extLst mod="1">
+  <p:extLst>
     <p:ext uri="{DCECCB84-F9BA-43D5-87BE-67443E8EF086}">
       <p15:sldGuideLst xmlns:p15="http://schemas.microsoft.com/office/powerpoint/2012/main">
         <p15:guide id="1" orient="horz" pos="2228">
@@ -4177,7 +4180,7 @@
       </p:transition>
     </mc:Fallback>
   </mc:AlternateContent>
-  <p:extLst mod="1">
+  <p:extLst>
     <p:ext uri="{DCECCB84-F9BA-43D5-87BE-67443E8EF086}">
       <p15:sldGuideLst xmlns:p15="http://schemas.microsoft.com/office/powerpoint/2012/main">
         <p15:guide id="1" orient="horz" pos="2228">
@@ -4345,7 +4348,7 @@
   <p:transition>
     <p:fade/>
   </p:transition>
-  <p:extLst mod="1">
+  <p:extLst>
     <p:ext uri="{DCECCB84-F9BA-43D5-87BE-67443E8EF086}">
       <p15:sldGuideLst xmlns:p15="http://schemas.microsoft.com/office/powerpoint/2012/main">
         <p15:guide id="1" orient="horz" pos="288" userDrawn="1">
@@ -4485,7 +4488,7 @@
   <p:transition>
     <p:fade/>
   </p:transition>
-  <p:extLst mod="1">
+  <p:extLst>
     <p:ext uri="{DCECCB84-F9BA-43D5-87BE-67443E8EF086}">
       <p15:sldGuideLst xmlns:p15="http://schemas.microsoft.com/office/powerpoint/2012/main">
         <p15:guide id="2" orient="horz" pos="1272" userDrawn="1">
@@ -4765,7 +4768,7 @@
   <p:transition>
     <p:fade/>
   </p:transition>
-  <p:extLst mod="1">
+  <p:extLst>
     <p:ext uri="{DCECCB84-F9BA-43D5-87BE-67443E8EF086}">
       <p15:sldGuideLst xmlns:p15="http://schemas.microsoft.com/office/powerpoint/2012/main">
         <p15:guide id="1" orient="horz" pos="288" userDrawn="1">
@@ -5045,7 +5048,7 @@
   <p:transition>
     <p:fade/>
   </p:transition>
-  <p:extLst mod="1">
+  <p:extLst>
     <p:ext uri="{DCECCB84-F9BA-43D5-87BE-67443E8EF086}">
       <p15:sldGuideLst xmlns:p15="http://schemas.microsoft.com/office/powerpoint/2012/main">
         <p15:guide id="1" orient="horz" pos="288" userDrawn="1">
@@ -5355,7 +5358,7 @@
       </p:transition>
     </mc:Fallback>
   </mc:AlternateContent>
-  <p:extLst mod="1">
+  <p:extLst>
     <p:ext uri="{DCECCB84-F9BA-43D5-87BE-67443E8EF086}">
       <p15:sldGuideLst xmlns:p15="http://schemas.microsoft.com/office/powerpoint/2012/main">
         <p15:guide id="1" orient="horz" pos="2228">
@@ -5442,7 +5445,7 @@
   <p:transition>
     <p:fade/>
   </p:transition>
-  <p:extLst mod="1">
+  <p:extLst>
     <p:ext uri="{DCECCB84-F9BA-43D5-87BE-67443E8EF086}">
       <p15:sldGuideLst xmlns:p15="http://schemas.microsoft.com/office/powerpoint/2012/main">
         <p15:guide id="3" orient="horz" pos="900" userDrawn="1">
@@ -5524,7 +5527,7 @@
   <p:transition>
     <p:fade/>
   </p:transition>
-  <p:extLst mod="1">
+  <p:extLst>
     <p:ext uri="{DCECCB84-F9BA-43D5-87BE-67443E8EF086}">
       <p15:sldGuideLst xmlns:p15="http://schemas.microsoft.com/office/powerpoint/2012/main">
         <p15:guide id="6" pos="779">
@@ -5729,7 +5732,7 @@
   <p:transition>
     <p:fade/>
   </p:transition>
-  <p:extLst mod="1">
+  <p:extLst>
     <p:ext uri="{DCECCB84-F9BA-43D5-87BE-67443E8EF086}">
       <p15:sldGuideLst xmlns:p15="http://schemas.microsoft.com/office/powerpoint/2012/main">
         <p15:guide id="6" pos="779">
@@ -6069,7 +6072,7 @@
   <p:transition>
     <p:fade/>
   </p:transition>
-  <p:extLst mod="1">
+  <p:extLst>
     <p:ext uri="{DCECCB84-F9BA-43D5-87BE-67443E8EF086}">
       <p15:sldGuideLst xmlns:p15="http://schemas.microsoft.com/office/powerpoint/2012/main">
         <p15:guide id="2" pos="3360" userDrawn="1">
@@ -6262,7 +6265,7 @@
   <p:transition>
     <p:fade/>
   </p:transition>
-  <p:extLst mod="1">
+  <p:extLst>
     <p:ext uri="{DCECCB84-F9BA-43D5-87BE-67443E8EF086}">
       <p15:sldGuideLst xmlns:p15="http://schemas.microsoft.com/office/powerpoint/2012/main">
         <p15:guide id="2" pos="3360" userDrawn="1">
@@ -6445,7 +6448,7 @@
   <p:transition>
     <p:fade/>
   </p:transition>
-  <p:extLst mod="1">
+  <p:extLst>
     <p:ext uri="{DCECCB84-F9BA-43D5-87BE-67443E8EF086}">
       <p15:sldGuideLst xmlns:p15="http://schemas.microsoft.com/office/powerpoint/2012/main">
         <p15:guide id="2" pos="3360">
@@ -6669,7 +6672,7 @@
       </p:transition>
     </mc:Fallback>
   </mc:AlternateContent>
-  <p:extLst mod="1">
+  <p:extLst>
     <p:ext uri="{DCECCB84-F9BA-43D5-87BE-67443E8EF086}">
       <p15:sldGuideLst xmlns:p15="http://schemas.microsoft.com/office/powerpoint/2012/main">
         <p15:guide id="1" orient="horz" pos="2160">
@@ -6832,7 +6835,7 @@
       </p:transition>
     </mc:Fallback>
   </mc:AlternateContent>
-  <p:extLst mod="1">
+  <p:extLst>
     <p:ext uri="{DCECCB84-F9BA-43D5-87BE-67443E8EF086}">
       <p15:sldGuideLst xmlns:p15="http://schemas.microsoft.com/office/powerpoint/2012/main">
         <p15:guide id="1" orient="horz" pos="2160">
@@ -6995,7 +6998,7 @@
       </p:transition>
     </mc:Fallback>
   </mc:AlternateContent>
-  <p:extLst mod="1">
+  <p:extLst>
     <p:ext uri="{DCECCB84-F9BA-43D5-87BE-67443E8EF086}">
       <p15:sldGuideLst xmlns:p15="http://schemas.microsoft.com/office/powerpoint/2012/main">
         <p15:guide id="1" orient="horz" pos="2160">
@@ -7201,7 +7204,7 @@
       </p:transition>
     </mc:Fallback>
   </mc:AlternateContent>
-  <p:extLst mod="1">
+  <p:extLst>
     <p:ext uri="{DCECCB84-F9BA-43D5-87BE-67443E8EF086}">
       <p15:sldGuideLst xmlns:p15="http://schemas.microsoft.com/office/powerpoint/2012/main">
         <p15:guide id="1" orient="horz" pos="2160" userDrawn="1">
@@ -7516,7 +7519,7 @@
       </p:transition>
     </mc:Fallback>
   </mc:AlternateContent>
-  <p:extLst mod="1">
+  <p:extLst>
     <p:ext uri="{DCECCB84-F9BA-43D5-87BE-67443E8EF086}">
       <p15:sldGuideLst xmlns:p15="http://schemas.microsoft.com/office/powerpoint/2012/main">
         <p15:guide id="1" orient="horz" pos="2228">
@@ -7674,7 +7677,7 @@
       </p:transition>
     </mc:Fallback>
   </mc:AlternateContent>
-  <p:extLst mod="1">
+  <p:extLst>
     <p:ext uri="{DCECCB84-F9BA-43D5-87BE-67443E8EF086}">
       <p15:sldGuideLst xmlns:p15="http://schemas.microsoft.com/office/powerpoint/2012/main">
         <p15:guide id="1" orient="horz" pos="2160">
@@ -7832,7 +7835,7 @@
       </p:transition>
     </mc:Fallback>
   </mc:AlternateContent>
-  <p:extLst mod="1">
+  <p:extLst>
     <p:ext uri="{DCECCB84-F9BA-43D5-87BE-67443E8EF086}">
       <p15:sldGuideLst xmlns:p15="http://schemas.microsoft.com/office/powerpoint/2012/main">
         <p15:guide id="1" orient="horz" pos="2160" userDrawn="1">
@@ -7891,7 +7894,7 @@
   <p:transition>
     <p:fade/>
   </p:transition>
-  <p:extLst mod="1">
+  <p:extLst>
     <p:ext uri="{DCECCB84-F9BA-43D5-87BE-67443E8EF086}">
       <p15:sldGuideLst xmlns:p15="http://schemas.microsoft.com/office/powerpoint/2012/main">
         <p15:guide id="1" orient="horz" pos="1272" userDrawn="1">
@@ -7950,7 +7953,7 @@
   <p:transition>
     <p:fade/>
   </p:transition>
-  <p:extLst mod="1">
+  <p:extLst>
     <p:ext uri="{DCECCB84-F9BA-43D5-87BE-67443E8EF086}">
       <p15:sldGuideLst xmlns:p15="http://schemas.microsoft.com/office/powerpoint/2012/main">
         <p15:guide id="1" orient="horz" pos="904" userDrawn="1">
@@ -8190,7 +8193,7 @@
   <p:transition>
     <p:fade/>
   </p:transition>
-  <p:extLst mod="1">
+  <p:extLst>
     <p:ext uri="{DCECCB84-F9BA-43D5-87BE-67443E8EF086}">
       <p15:sldGuideLst xmlns:p15="http://schemas.microsoft.com/office/powerpoint/2012/main">
         <p15:guide id="1" orient="horz" pos="1272" userDrawn="1">
@@ -8836,7 +8839,7 @@
   <p:transition>
     <p:fade/>
   </p:transition>
-  <p:extLst mod="1">
+  <p:extLst>
     <p:ext uri="{DCECCB84-F9BA-43D5-87BE-67443E8EF086}">
       <p15:sldGuideLst xmlns:p15="http://schemas.microsoft.com/office/powerpoint/2012/main">
         <p15:guide id="1" orient="horz" pos="904" userDrawn="1">
@@ -9140,7 +9143,7 @@
       </p:transition>
     </mc:Fallback>
   </mc:AlternateContent>
-  <p:extLst mod="1">
+  <p:extLst>
     <p:ext uri="{DCECCB84-F9BA-43D5-87BE-67443E8EF086}">
       <p15:sldGuideLst xmlns:p15="http://schemas.microsoft.com/office/powerpoint/2012/main">
         <p15:guide id="1" orient="horz" pos="2228">
@@ -9312,7 +9315,7 @@
   <p:transition>
     <p:fade/>
   </p:transition>
-  <p:extLst mod="1">
+  <p:extLst>
     <p:ext uri="{DCECCB84-F9BA-43D5-87BE-67443E8EF086}">
       <p15:sldGuideLst xmlns:p15="http://schemas.microsoft.com/office/powerpoint/2012/main">
         <p15:guide id="1" orient="horz" pos="904">
@@ -9592,7 +9595,7 @@
       </p:transition>
     </mc:Fallback>
   </mc:AlternateContent>
-  <p:extLst mod="1">
+  <p:extLst>
     <p:ext uri="{DCECCB84-F9BA-43D5-87BE-67443E8EF086}">
       <p15:sldGuideLst xmlns:p15="http://schemas.microsoft.com/office/powerpoint/2012/main">
         <p15:guide id="1" orient="horz" pos="2228">
@@ -9867,7 +9870,7 @@
       </p:transition>
     </mc:Fallback>
   </mc:AlternateContent>
-  <p:extLst mod="1">
+  <p:extLst>
     <p:ext uri="{DCECCB84-F9BA-43D5-87BE-67443E8EF086}">
       <p15:sldGuideLst xmlns:p15="http://schemas.microsoft.com/office/powerpoint/2012/main">
         <p15:guide id="2" orient="horz" pos="2496">
@@ -10147,7 +10150,7 @@
       </p:transition>
     </mc:Fallback>
   </mc:AlternateContent>
-  <p:extLst mod="1">
+  <p:extLst>
     <p:ext uri="{DCECCB84-F9BA-43D5-87BE-67443E8EF086}">
       <p15:sldGuideLst xmlns:p15="http://schemas.microsoft.com/office/powerpoint/2012/main">
         <p15:guide id="2" orient="horz" pos="2496">
@@ -10424,7 +10427,7 @@
       </p:transition>
     </mc:Fallback>
   </mc:AlternateContent>
-  <p:extLst mod="1">
+  <p:extLst>
     <p:ext uri="{DCECCB84-F9BA-43D5-87BE-67443E8EF086}">
       <p15:sldGuideLst xmlns:p15="http://schemas.microsoft.com/office/powerpoint/2012/main">
         <p15:guide id="2" orient="horz" pos="2496">
@@ -10701,7 +10704,7 @@
       </p:transition>
     </mc:Fallback>
   </mc:AlternateContent>
-  <p:extLst mod="1">
+  <p:extLst>
     <p:ext uri="{DCECCB84-F9BA-43D5-87BE-67443E8EF086}">
       <p15:sldGuideLst xmlns:p15="http://schemas.microsoft.com/office/powerpoint/2012/main">
         <p15:guide id="2" orient="horz" pos="2496">
@@ -10958,7 +10961,7 @@
       </p:transition>
     </mc:Fallback>
   </mc:AlternateContent>
-  <p:extLst mod="1">
+  <p:extLst>
     <p:ext uri="{DCECCB84-F9BA-43D5-87BE-67443E8EF086}">
       <p15:sldGuideLst xmlns:p15="http://schemas.microsoft.com/office/powerpoint/2012/main">
         <p15:guide id="1" orient="horz" pos="2228">
@@ -11205,7 +11208,7 @@
       </p:transition>
     </mc:Fallback>
   </mc:AlternateContent>
-  <p:extLst mod="1">
+  <p:extLst>
     <p:ext uri="{DCECCB84-F9BA-43D5-87BE-67443E8EF086}">
       <p15:sldGuideLst xmlns:p15="http://schemas.microsoft.com/office/powerpoint/2012/main">
         <p15:guide id="1" orient="horz" pos="2228">
@@ -11373,7 +11376,7 @@
   <p:transition>
     <p:fade/>
   </p:transition>
-  <p:extLst mod="1">
+  <p:extLst>
     <p:ext uri="{DCECCB84-F9BA-43D5-87BE-67443E8EF086}">
       <p15:sldGuideLst xmlns:p15="http://schemas.microsoft.com/office/powerpoint/2012/main">
         <p15:guide id="1" orient="horz" pos="288">
@@ -11513,7 +11516,7 @@
   <p:transition>
     <p:fade/>
   </p:transition>
-  <p:extLst mod="1">
+  <p:extLst>
     <p:ext uri="{DCECCB84-F9BA-43D5-87BE-67443E8EF086}">
       <p15:sldGuideLst xmlns:p15="http://schemas.microsoft.com/office/powerpoint/2012/main">
         <p15:guide id="2" orient="horz" pos="1272">
@@ -11793,7 +11796,7 @@
   <p:transition>
     <p:fade/>
   </p:transition>
-  <p:extLst mod="1">
+  <p:extLst>
     <p:ext uri="{DCECCB84-F9BA-43D5-87BE-67443E8EF086}">
       <p15:sldGuideLst xmlns:p15="http://schemas.microsoft.com/office/powerpoint/2012/main">
         <p15:guide id="1" orient="horz" pos="288">
@@ -12752,7 +12755,7 @@
   <p:transition>
     <p:fade/>
   </p:transition>
-  <p:extLst mod="1">
+  <p:extLst>
     <p:ext uri="{DCECCB84-F9BA-43D5-87BE-67443E8EF086}">
       <p15:sldGuideLst xmlns:p15="http://schemas.microsoft.com/office/powerpoint/2012/main">
         <p15:guide id="1" orient="horz" pos="1272">
@@ -13032,7 +13035,7 @@
   <p:transition>
     <p:fade/>
   </p:transition>
-  <p:extLst mod="1">
+  <p:extLst>
     <p:ext uri="{DCECCB84-F9BA-43D5-87BE-67443E8EF086}">
       <p15:sldGuideLst xmlns:p15="http://schemas.microsoft.com/office/powerpoint/2012/main">
         <p15:guide id="1" orient="horz" pos="288">
@@ -13114,7 +13117,7 @@
   <p:transition>
     <p:fade/>
   </p:transition>
-  <p:extLst mod="1">
+  <p:extLst>
     <p:ext uri="{DCECCB84-F9BA-43D5-87BE-67443E8EF086}">
       <p15:sldGuideLst xmlns:p15="http://schemas.microsoft.com/office/powerpoint/2012/main">
         <p15:guide id="3" orient="horz" pos="900">
@@ -13196,7 +13199,7 @@
   <p:transition>
     <p:fade/>
   </p:transition>
-  <p:extLst mod="1">
+  <p:extLst>
     <p:ext uri="{DCECCB84-F9BA-43D5-87BE-67443E8EF086}">
       <p15:sldGuideLst xmlns:p15="http://schemas.microsoft.com/office/powerpoint/2012/main">
         <p15:guide id="6" pos="779">
@@ -13401,7 +13404,7 @@
   <p:transition>
     <p:fade/>
   </p:transition>
-  <p:extLst mod="1">
+  <p:extLst>
     <p:ext uri="{DCECCB84-F9BA-43D5-87BE-67443E8EF086}">
       <p15:sldGuideLst xmlns:p15="http://schemas.microsoft.com/office/powerpoint/2012/main">
         <p15:guide id="6" pos="779">
@@ -13741,7 +13744,7 @@
   <p:transition>
     <p:fade/>
   </p:transition>
-  <p:extLst mod="1">
+  <p:extLst>
     <p:ext uri="{DCECCB84-F9BA-43D5-87BE-67443E8EF086}">
       <p15:sldGuideLst xmlns:p15="http://schemas.microsoft.com/office/powerpoint/2012/main">
         <p15:guide id="2" pos="3360">
@@ -13934,7 +13937,7 @@
   <p:transition>
     <p:fade/>
   </p:transition>
-  <p:extLst mod="1">
+  <p:extLst>
     <p:ext uri="{DCECCB84-F9BA-43D5-87BE-67443E8EF086}">
       <p15:sldGuideLst xmlns:p15="http://schemas.microsoft.com/office/powerpoint/2012/main">
         <p15:guide id="2" pos="3360">
@@ -14117,7 +14120,7 @@
   <p:transition>
     <p:fade/>
   </p:transition>
-  <p:extLst mod="1">
+  <p:extLst>
     <p:ext uri="{DCECCB84-F9BA-43D5-87BE-67443E8EF086}">
       <p15:sldGuideLst xmlns:p15="http://schemas.microsoft.com/office/powerpoint/2012/main">
         <p15:guide id="2" pos="3360">
@@ -14336,7 +14339,7 @@
       </p:transition>
     </mc:Fallback>
   </mc:AlternateContent>
-  <p:extLst mod="1">
+  <p:extLst>
     <p:ext uri="{DCECCB84-F9BA-43D5-87BE-67443E8EF086}">
       <p15:sldGuideLst xmlns:p15="http://schemas.microsoft.com/office/powerpoint/2012/main">
         <p15:guide id="1" orient="horz" pos="2160">
@@ -14494,7 +14497,7 @@
       </p:transition>
     </mc:Fallback>
   </mc:AlternateContent>
-  <p:extLst mod="1">
+  <p:extLst>
     <p:ext uri="{DCECCB84-F9BA-43D5-87BE-67443E8EF086}">
       <p15:sldGuideLst xmlns:p15="http://schemas.microsoft.com/office/powerpoint/2012/main">
         <p15:guide id="1" orient="horz" pos="2160">
@@ -14652,7 +14655,7 @@
       </p:transition>
     </mc:Fallback>
   </mc:AlternateContent>
-  <p:extLst mod="1">
+  <p:extLst>
     <p:ext uri="{DCECCB84-F9BA-43D5-87BE-67443E8EF086}">
       <p15:sldGuideLst xmlns:p15="http://schemas.microsoft.com/office/powerpoint/2012/main">
         <p15:guide id="1" orient="horz" pos="2160">
@@ -14937,7 +14940,7 @@
       </p:transition>
     </mc:Fallback>
   </mc:AlternateContent>
-  <p:extLst mod="1">
+  <p:extLst>
     <p:ext uri="{DCECCB84-F9BA-43D5-87BE-67443E8EF086}">
       <p15:sldGuideLst xmlns:p15="http://schemas.microsoft.com/office/powerpoint/2012/main">
         <p15:guide id="1" orient="horz" pos="2228">
@@ -15143,7 +15146,7 @@
       </p:transition>
     </mc:Fallback>
   </mc:AlternateContent>
-  <p:extLst mod="1">
+  <p:extLst>
     <p:ext uri="{DCECCB84-F9BA-43D5-87BE-67443E8EF086}">
       <p15:sldGuideLst xmlns:p15="http://schemas.microsoft.com/office/powerpoint/2012/main">
         <p15:guide id="1" orient="horz" pos="2160">
@@ -15301,7 +15304,7 @@
       </p:transition>
     </mc:Fallback>
   </mc:AlternateContent>
-  <p:extLst mod="1">
+  <p:extLst>
     <p:ext uri="{DCECCB84-F9BA-43D5-87BE-67443E8EF086}">
       <p15:sldGuideLst xmlns:p15="http://schemas.microsoft.com/office/powerpoint/2012/main">
         <p15:guide id="1" orient="horz" pos="2160">
@@ -15459,7 +15462,7 @@
       </p:transition>
     </mc:Fallback>
   </mc:AlternateContent>
-  <p:extLst mod="1">
+  <p:extLst>
     <p:ext uri="{DCECCB84-F9BA-43D5-87BE-67443E8EF086}">
       <p15:sldGuideLst xmlns:p15="http://schemas.microsoft.com/office/powerpoint/2012/main">
         <p15:guide id="1" orient="horz" pos="2160">
@@ -15518,7 +15521,7 @@
   <p:transition>
     <p:fade/>
   </p:transition>
-  <p:extLst mod="1">
+  <p:extLst>
     <p:ext uri="{DCECCB84-F9BA-43D5-87BE-67443E8EF086}">
       <p15:sldGuideLst xmlns:p15="http://schemas.microsoft.com/office/powerpoint/2012/main">
         <p15:guide id="1" orient="horz" pos="1272">
@@ -15577,7 +15580,7 @@
   <p:transition>
     <p:fade/>
   </p:transition>
-  <p:extLst mod="1">
+  <p:extLst>
     <p:ext uri="{DCECCB84-F9BA-43D5-87BE-67443E8EF086}">
       <p15:sldGuideLst xmlns:p15="http://schemas.microsoft.com/office/powerpoint/2012/main">
         <p15:guide id="1" orient="horz" pos="904">
@@ -15816,7 +15819,7 @@
   <p:transition>
     <p:fade/>
   </p:transition>
-  <p:extLst mod="1">
+  <p:extLst>
     <p:ext uri="{DCECCB84-F9BA-43D5-87BE-67443E8EF086}">
       <p15:sldGuideLst xmlns:p15="http://schemas.microsoft.com/office/powerpoint/2012/main">
         <p15:guide id="1" orient="horz" pos="1272">
@@ -16330,7 +16333,7 @@
   <p:transition>
     <p:fade/>
   </p:transition>
-  <p:extLst mod="1">
+  <p:extLst>
     <p:ext uri="{DCECCB84-F9BA-43D5-87BE-67443E8EF086}">
       <p15:sldGuideLst xmlns:p15="http://schemas.microsoft.com/office/powerpoint/2012/main">
         <p15:guide id="1" orient="horz" pos="904">
@@ -16602,7 +16605,7 @@
       </p:transition>
     </mc:Fallback>
   </mc:AlternateContent>
-  <p:extLst mod="1">
+  <p:extLst>
     <p:ext uri="{DCECCB84-F9BA-43D5-87BE-67443E8EF086}">
       <p15:sldGuideLst xmlns:p15="http://schemas.microsoft.com/office/powerpoint/2012/main">
         <p15:guide id="1" orient="horz" pos="2228">
@@ -16887,7 +16890,7 @@
       </p:transition>
     </mc:Fallback>
   </mc:AlternateContent>
-  <p:extLst mod="1">
+  <p:extLst>
     <p:ext uri="{DCECCB84-F9BA-43D5-87BE-67443E8EF086}">
       <p15:sldGuideLst xmlns:p15="http://schemas.microsoft.com/office/powerpoint/2012/main">
         <p15:guide id="1" orient="horz" pos="2228">
@@ -17162,7 +17165,7 @@
       </p:transition>
     </mc:Fallback>
   </mc:AlternateContent>
-  <p:extLst mod="1">
+  <p:extLst>
     <p:ext uri="{DCECCB84-F9BA-43D5-87BE-67443E8EF086}">
       <p15:sldGuideLst xmlns:p15="http://schemas.microsoft.com/office/powerpoint/2012/main">
         <p15:guide id="2" orient="horz" pos="2496" userDrawn="1">
@@ -19462,7 +19465,7 @@
       </a:lvl9pPr>
     </p:otherStyle>
   </p:txStyles>
-  <p:extLst mod="1">
+  <p:extLst>
     <p:ext uri="{27BBF7A9-308A-43DC-89C8-2F10F3537804}">
       <p15:sldGuideLst xmlns:p15="http://schemas.microsoft.com/office/powerpoint/2012/main">
         <p15:guide id="16" pos="368" userDrawn="1">
@@ -21767,7 +21770,7 @@
       </a:lvl9pPr>
     </p:otherStyle>
   </p:txStyles>
-  <p:extLst mod="1">
+  <p:extLst>
     <p:ext uri="{27BBF7A9-308A-43DC-89C8-2F10F3537804}">
       <p15:sldGuideLst xmlns:p15="http://schemas.microsoft.com/office/powerpoint/2012/main">
         <p15:guide id="16" pos="368">
@@ -21897,6 +21900,265 @@
     <p:extLst>
       <p:ext uri="{BB962C8B-B14F-4D97-AF65-F5344CB8AC3E}">
         <p14:creationId xmlns:p14="http://schemas.microsoft.com/office/powerpoint/2010/main" val="3182288875"/>
+      </p:ext>
+    </p:extLst>
+  </p:cSld>
+  <p:clrMapOvr>
+    <a:masterClrMapping/>
+  </p:clrMapOvr>
+  <mc:AlternateContent xmlns:mc="http://schemas.openxmlformats.org/markup-compatibility/2006" xmlns:p14="http://schemas.microsoft.com/office/powerpoint/2010/main">
+    <mc:Choice Requires="p14">
+      <p:transition spd="med" p14:dur="700">
+        <p:fade/>
+      </p:transition>
+    </mc:Choice>
+    <mc:Fallback xmlns="">
+      <p:transition spd="med">
+        <p:fade/>
+      </p:transition>
+    </mc:Fallback>
+  </mc:AlternateContent>
+</p:sld>
+</file>
+
+<file path=ppt/slides/slide10.xml><?xml version="1.0" encoding="utf-8"?>
+<p:sld xmlns:a="http://schemas.openxmlformats.org/drawingml/2006/main" xmlns:r="http://schemas.openxmlformats.org/officeDocument/2006/relationships" xmlns:p="http://schemas.openxmlformats.org/presentationml/2006/main">
+  <p:cSld>
+    <p:spTree>
+      <p:nvGrpSpPr>
+        <p:cNvPr id="1" name=""/>
+        <p:cNvGrpSpPr/>
+        <p:nvPr/>
+      </p:nvGrpSpPr>
+      <p:grpSpPr>
+        <a:xfrm>
+          <a:off x="0" y="0"/>
+          <a:ext cx="0" cy="0"/>
+          <a:chOff x="0" y="0"/>
+          <a:chExt cx="0" cy="0"/>
+        </a:xfrm>
+      </p:grpSpPr>
+      <p:sp>
+        <p:nvSpPr>
+          <p:cNvPr id="3" name="Title 2"/>
+          <p:cNvSpPr>
+            <a:spLocks noGrp="1"/>
+          </p:cNvSpPr>
+          <p:nvPr>
+            <p:ph type="title"/>
+          </p:nvPr>
+        </p:nvSpPr>
+        <p:spPr/>
+        <p:txBody>
+          <a:bodyPr/>
+          <a:lstStyle/>
+          <a:p>
+            <a:r>
+              <a:rPr lang="en-US" dirty="0"/>
+              <a:t>Demo</a:t>
+            </a:r>
+          </a:p>
+        </p:txBody>
+      </p:sp>
+      <p:sp>
+        <p:nvSpPr>
+          <p:cNvPr id="4" name="Text Placeholder 3"/>
+          <p:cNvSpPr>
+            <a:spLocks noGrp="1"/>
+          </p:cNvSpPr>
+          <p:nvPr>
+            <p:ph type="body" sz="quarter" idx="12"/>
+          </p:nvPr>
+        </p:nvSpPr>
+        <p:spPr/>
+        <p:txBody>
+          <a:bodyPr/>
+          <a:lstStyle/>
+          <a:p>
+            <a:r>
+              <a:rPr lang="en-US" dirty="0"/>
+              <a:t>Paul Yuknewicz</a:t>
+            </a:r>
+          </a:p>
+        </p:txBody>
+      </p:sp>
+    </p:spTree>
+    <p:extLst>
+      <p:ext uri="{BB962C8B-B14F-4D97-AF65-F5344CB8AC3E}">
+        <p14:creationId xmlns:p14="http://schemas.microsoft.com/office/powerpoint/2010/main" val="203203085"/>
+      </p:ext>
+    </p:extLst>
+  </p:cSld>
+  <p:clrMapOvr>
+    <a:masterClrMapping/>
+  </p:clrMapOvr>
+  <mc:AlternateContent xmlns:mc="http://schemas.openxmlformats.org/markup-compatibility/2006" xmlns:p14="http://schemas.microsoft.com/office/powerpoint/2010/main">
+    <mc:Choice Requires="p14">
+      <p:transition spd="med" p14:dur="700">
+        <p:fade/>
+      </p:transition>
+    </mc:Choice>
+    <mc:Fallback xmlns="">
+      <p:transition spd="med">
+        <p:fade/>
+      </p:transition>
+    </mc:Fallback>
+  </mc:AlternateContent>
+</p:sld>
+</file>
+
+<file path=ppt/slides/slide11.xml><?xml version="1.0" encoding="utf-8"?>
+<p:sld xmlns:a="http://schemas.openxmlformats.org/drawingml/2006/main" xmlns:r="http://schemas.openxmlformats.org/officeDocument/2006/relationships" xmlns:p="http://schemas.openxmlformats.org/presentationml/2006/main">
+  <p:cSld>
+    <p:spTree>
+      <p:nvGrpSpPr>
+        <p:cNvPr id="1" name=""/>
+        <p:cNvGrpSpPr/>
+        <p:nvPr/>
+      </p:nvGrpSpPr>
+      <p:grpSpPr>
+        <a:xfrm>
+          <a:off x="0" y="0"/>
+          <a:ext cx="0" cy="0"/>
+          <a:chOff x="0" y="0"/>
+          <a:chExt cx="0" cy="0"/>
+        </a:xfrm>
+      </p:grpSpPr>
+      <p:sp>
+        <p:nvSpPr>
+          <p:cNvPr id="2" name="Title 1"/>
+          <p:cNvSpPr>
+            <a:spLocks noGrp="1"/>
+          </p:cNvSpPr>
+          <p:nvPr>
+            <p:ph type="title"/>
+          </p:nvPr>
+        </p:nvSpPr>
+        <p:spPr>
+          <a:xfrm>
+            <a:off x="588263" y="457200"/>
+            <a:ext cx="11018520" cy="553998"/>
+          </a:xfrm>
+        </p:spPr>
+        <p:txBody>
+          <a:bodyPr/>
+          <a:lstStyle/>
+          <a:p>
+            <a:r>
+              <a:rPr lang="en-US" dirty="0"/>
+              <a:t>Summary</a:t>
+            </a:r>
+            <a:endParaRPr lang="en-US" sz="2000" dirty="0"/>
+          </a:p>
+        </p:txBody>
+      </p:sp>
+      <p:sp>
+        <p:nvSpPr>
+          <p:cNvPr id="3" name="Text Placeholder 2"/>
+          <p:cNvSpPr>
+            <a:spLocks noGrp="1"/>
+          </p:cNvSpPr>
+          <p:nvPr>
+            <p:ph type="body" sz="quarter" idx="10"/>
+          </p:nvPr>
+        </p:nvSpPr>
+        <p:spPr>
+          <a:xfrm>
+            <a:off x="590868" y="2023427"/>
+            <a:ext cx="6429364" cy="1661993"/>
+          </a:xfrm>
+        </p:spPr>
+        <p:txBody>
+          <a:bodyPr/>
+          <a:lstStyle/>
+          <a:p>
+            <a:pPr marL="571500" lvl="1" indent="-342900">
+              <a:buFont typeface="Arial" panose="020B0604020202020204" pitchFamily="34" charset="0"/>
+              <a:buChar char="•"/>
+            </a:pPr>
+            <a:r>
+              <a:rPr lang="en-US" dirty="0"/>
+              <a:t>Install Visual Studio 2019 with Web, Azure or Container workloads </a:t>
+            </a:r>
+          </a:p>
+          <a:p>
+            <a:pPr marL="571500" lvl="1" indent="-342900">
+              <a:buFont typeface="Arial" panose="020B0604020202020204" pitchFamily="34" charset="0"/>
+              <a:buChar char="•"/>
+            </a:pPr>
+            <a:r>
+              <a:rPr lang="en-US" dirty="0"/>
+              <a:t>Build and debug containers in VS</a:t>
+            </a:r>
+          </a:p>
+          <a:p>
+            <a:pPr marL="571500" lvl="1" indent="-342900">
+              <a:buFont typeface="Arial" panose="020B0604020202020204" pitchFamily="34" charset="0"/>
+              <a:buChar char="•"/>
+            </a:pPr>
+            <a:r>
+              <a:rPr lang="en-US" dirty="0"/>
+              <a:t>Learn more: </a:t>
+            </a:r>
+            <a:r>
+              <a:rPr lang="en-US" dirty="0">
+                <a:hlinkClick r:id="rId3"/>
+              </a:rPr>
+              <a:t>https://docs.microsoft.com/en-us/visualstudio/containers</a:t>
+            </a:r>
+            <a:r>
+              <a:rPr lang="en-US" dirty="0"/>
+              <a:t> </a:t>
+            </a:r>
+          </a:p>
+        </p:txBody>
+      </p:sp>
+    </p:spTree>
+    <p:extLst>
+      <p:ext uri="{BB962C8B-B14F-4D97-AF65-F5344CB8AC3E}">
+        <p14:creationId xmlns:p14="http://schemas.microsoft.com/office/powerpoint/2010/main" val="2968522231"/>
+      </p:ext>
+    </p:extLst>
+  </p:cSld>
+  <p:clrMapOvr>
+    <a:masterClrMapping/>
+  </p:clrMapOvr>
+  <mc:AlternateContent xmlns:mc="http://schemas.openxmlformats.org/markup-compatibility/2006" xmlns:p14="http://schemas.microsoft.com/office/powerpoint/2010/main">
+    <mc:Choice Requires="p14">
+      <p:transition spd="med" p14:dur="700">
+        <p:fade/>
+      </p:transition>
+    </mc:Choice>
+    <mc:Fallback xmlns="">
+      <p:transition spd="med">
+        <p:fade/>
+      </p:transition>
+    </mc:Fallback>
+  </mc:AlternateContent>
+</p:sld>
+</file>
+
+<file path=ppt/slides/slide12.xml><?xml version="1.0" encoding="utf-8"?>
+<p:sld xmlns:a="http://schemas.openxmlformats.org/drawingml/2006/main" xmlns:r="http://schemas.openxmlformats.org/officeDocument/2006/relationships" xmlns:p="http://schemas.openxmlformats.org/presentationml/2006/main">
+  <p:cSld>
+    <p:spTree>
+      <p:nvGrpSpPr>
+        <p:cNvPr id="1" name=""/>
+        <p:cNvGrpSpPr/>
+        <p:nvPr/>
+      </p:nvGrpSpPr>
+      <p:grpSpPr>
+        <a:xfrm>
+          <a:off x="0" y="0"/>
+          <a:ext cx="0" cy="0"/>
+          <a:chOff x="0" y="0"/>
+          <a:chExt cx="0" cy="0"/>
+        </a:xfrm>
+      </p:grpSpPr>
+    </p:spTree>
+    <p:extLst>
+      <p:ext uri="{BB962C8B-B14F-4D97-AF65-F5344CB8AC3E}">
+        <p14:creationId xmlns:p14="http://schemas.microsoft.com/office/powerpoint/2010/main" val="2402828649"/>
       </p:ext>
     </p:extLst>
   </p:cSld>
@@ -22486,6 +22748,547 @@
 </file>
 
 <file path=ppt/slides/slide6.xml><?xml version="1.0" encoding="utf-8"?>
+<p:sld xmlns:a="http://schemas.openxmlformats.org/drawingml/2006/main" xmlns:r="http://schemas.openxmlformats.org/officeDocument/2006/relationships" xmlns:p="http://schemas.openxmlformats.org/presentationml/2006/main">
+  <p:cSld>
+    <p:spTree>
+      <p:nvGrpSpPr>
+        <p:cNvPr id="1" name=""/>
+        <p:cNvGrpSpPr/>
+        <p:nvPr/>
+      </p:nvGrpSpPr>
+      <p:grpSpPr>
+        <a:xfrm>
+          <a:off x="0" y="0"/>
+          <a:ext cx="0" cy="0"/>
+          <a:chOff x="0" y="0"/>
+          <a:chExt cx="0" cy="0"/>
+        </a:xfrm>
+      </p:grpSpPr>
+      <p:sp>
+        <p:nvSpPr>
+          <p:cNvPr id="2" name="Title 1">
+            <a:extLst>
+              <a:ext uri="{FF2B5EF4-FFF2-40B4-BE49-F238E27FC236}">
+                <a16:creationId xmlns:a16="http://schemas.microsoft.com/office/drawing/2014/main" id="{250D61E4-D450-4764-BC0C-E72616B046C7}"/>
+              </a:ext>
+            </a:extLst>
+          </p:cNvPr>
+          <p:cNvSpPr>
+            <a:spLocks noGrp="1"/>
+          </p:cNvSpPr>
+          <p:nvPr>
+            <p:ph type="title"/>
+          </p:nvPr>
+        </p:nvSpPr>
+        <p:spPr/>
+        <p:txBody>
+          <a:bodyPr/>
+          <a:lstStyle/>
+          <a:p>
+            <a:r>
+              <a:rPr lang="en-US" dirty="0"/>
+              <a:t>New Visual Studio tools for Docker Containers</a:t>
+            </a:r>
+          </a:p>
+        </p:txBody>
+      </p:sp>
+      <p:sp>
+        <p:nvSpPr>
+          <p:cNvPr id="3" name="Text Placeholder 2">
+            <a:extLst>
+              <a:ext uri="{FF2B5EF4-FFF2-40B4-BE49-F238E27FC236}">
+                <a16:creationId xmlns:a16="http://schemas.microsoft.com/office/drawing/2014/main" id="{98FEA026-E3F7-481C-B183-48679A020316}"/>
+              </a:ext>
+            </a:extLst>
+          </p:cNvPr>
+          <p:cNvSpPr>
+            <a:spLocks noGrp="1"/>
+          </p:cNvSpPr>
+          <p:nvPr>
+            <p:ph type="body" sz="quarter" idx="10"/>
+          </p:nvPr>
+        </p:nvSpPr>
+        <p:spPr>
+          <a:xfrm>
+            <a:off x="586390" y="1434370"/>
+            <a:ext cx="11018520" cy="2215991"/>
+          </a:xfrm>
+        </p:spPr>
+        <p:txBody>
+          <a:bodyPr/>
+          <a:lstStyle/>
+          <a:p>
+            <a:pPr marL="457200" indent="-457200">
+              <a:buFont typeface="Arial" panose="020B0604020202020204" pitchFamily="34" charset="0"/>
+              <a:buChar char="•"/>
+            </a:pPr>
+            <a:r>
+              <a:rPr lang="en-US" dirty="0"/>
+              <a:t>Container window</a:t>
+            </a:r>
+          </a:p>
+          <a:p>
+            <a:pPr marL="685800" lvl="1" indent="-457200">
+              <a:buFont typeface="Arial" panose="020B0604020202020204" pitchFamily="34" charset="0"/>
+              <a:buChar char="•"/>
+            </a:pPr>
+            <a:r>
+              <a:rPr lang="en-US" dirty="0"/>
+              <a:t>Inspect environment variables, ports, files!, console shell into the container, stream logs</a:t>
+            </a:r>
+          </a:p>
+          <a:p>
+            <a:pPr marL="685800" lvl="1" indent="-457200">
+              <a:buFont typeface="Arial" panose="020B0604020202020204" pitchFamily="34" charset="0"/>
+              <a:buChar char="•"/>
+            </a:pPr>
+            <a:r>
+              <a:rPr lang="en-US" dirty="0"/>
+              <a:t>Makes testing and debugging easier</a:t>
+            </a:r>
+          </a:p>
+          <a:p>
+            <a:pPr marL="685800" lvl="1" indent="-457200">
+              <a:buFont typeface="Arial" panose="020B0604020202020204" pitchFamily="34" charset="0"/>
+              <a:buChar char="•"/>
+            </a:pPr>
+            <a:r>
+              <a:rPr lang="en-US" dirty="0"/>
+              <a:t>VS Extension today: </a:t>
+            </a:r>
+            <a:r>
+              <a:rPr lang="en-US" dirty="0">
+                <a:hlinkClick r:id="rId2"/>
+              </a:rPr>
+              <a:t>https://marketplace.visualstudio.com/items?itemName=ms-azuretools.vs-containers-tools-extensions</a:t>
+            </a:r>
+            <a:endParaRPr lang="en-US" dirty="0"/>
+          </a:p>
+          <a:p>
+            <a:pPr marL="685800" lvl="1" indent="-457200">
+              <a:buFont typeface="Arial" panose="020B0604020202020204" pitchFamily="34" charset="0"/>
+              <a:buChar char="•"/>
+            </a:pPr>
+            <a:r>
+              <a:rPr lang="en-US" dirty="0"/>
+              <a:t>ETA is Visual Studio 2019 16.4 in box</a:t>
+            </a:r>
+          </a:p>
+        </p:txBody>
+      </p:sp>
+      <p:pic>
+        <p:nvPicPr>
+          <p:cNvPr id="1026" name="Picture 2">
+            <a:extLst>
+              <a:ext uri="{FF2B5EF4-FFF2-40B4-BE49-F238E27FC236}">
+                <a16:creationId xmlns:a16="http://schemas.microsoft.com/office/drawing/2014/main" id="{8B7BD578-F894-4214-8FD0-918E9FD59A6A}"/>
+              </a:ext>
+            </a:extLst>
+          </p:cNvPr>
+          <p:cNvPicPr>
+            <a:picLocks noChangeAspect="1" noChangeArrowheads="1"/>
+          </p:cNvPicPr>
+          <p:nvPr/>
+        </p:nvPicPr>
+        <p:blipFill>
+          <a:blip r:embed="rId3">
+            <a:extLst>
+              <a:ext uri="{28A0092B-C50C-407E-A947-70E740481C1C}">
+                <a14:useLocalDpi xmlns:a14="http://schemas.microsoft.com/office/drawing/2010/main" val="0"/>
+              </a:ext>
+            </a:extLst>
+          </a:blip>
+          <a:srcRect/>
+          <a:stretch>
+            <a:fillRect/>
+          </a:stretch>
+        </p:blipFill>
+        <p:spPr bwMode="auto">
+          <a:xfrm>
+            <a:off x="1205023" y="3774190"/>
+            <a:ext cx="9214534" cy="2949131"/>
+          </a:xfrm>
+          <a:prstGeom prst="rect">
+            <a:avLst/>
+          </a:prstGeom>
+          <a:noFill/>
+          <a:extLst>
+            <a:ext uri="{909E8E84-426E-40DD-AFC4-6F175D3DCCD1}">
+              <a14:hiddenFill xmlns:a14="http://schemas.microsoft.com/office/drawing/2010/main">
+                <a:solidFill>
+                  <a:srgbClr val="FFFFFF"/>
+                </a:solidFill>
+              </a14:hiddenFill>
+            </a:ext>
+          </a:extLst>
+        </p:spPr>
+      </p:pic>
+    </p:spTree>
+    <p:extLst>
+      <p:ext uri="{BB962C8B-B14F-4D97-AF65-F5344CB8AC3E}">
+        <p14:creationId xmlns:p14="http://schemas.microsoft.com/office/powerpoint/2010/main" val="1418676265"/>
+      </p:ext>
+    </p:extLst>
+  </p:cSld>
+  <p:clrMapOvr>
+    <a:masterClrMapping/>
+  </p:clrMapOvr>
+  <p:transition>
+    <p:fade/>
+  </p:transition>
+</p:sld>
+</file>
+
+<file path=ppt/slides/slide7.xml><?xml version="1.0" encoding="utf-8"?>
+<p:sld xmlns:a="http://schemas.openxmlformats.org/drawingml/2006/main" xmlns:r="http://schemas.openxmlformats.org/officeDocument/2006/relationships" xmlns:p="http://schemas.openxmlformats.org/presentationml/2006/main">
+  <p:cSld>
+    <p:spTree>
+      <p:nvGrpSpPr>
+        <p:cNvPr id="1" name=""/>
+        <p:cNvGrpSpPr/>
+        <p:nvPr/>
+      </p:nvGrpSpPr>
+      <p:grpSpPr>
+        <a:xfrm>
+          <a:off x="0" y="0"/>
+          <a:ext cx="0" cy="0"/>
+          <a:chOff x="0" y="0"/>
+          <a:chExt cx="0" cy="0"/>
+        </a:xfrm>
+      </p:grpSpPr>
+      <p:sp>
+        <p:nvSpPr>
+          <p:cNvPr id="2" name="Title 1">
+            <a:extLst>
+              <a:ext uri="{FF2B5EF4-FFF2-40B4-BE49-F238E27FC236}">
+                <a16:creationId xmlns:a16="http://schemas.microsoft.com/office/drawing/2014/main" id="{4673041D-4D08-4781-BF52-0B7A3E214FFC}"/>
+              </a:ext>
+            </a:extLst>
+          </p:cNvPr>
+          <p:cNvSpPr>
+            <a:spLocks noGrp="1"/>
+          </p:cNvSpPr>
+          <p:nvPr>
+            <p:ph type="title"/>
+          </p:nvPr>
+        </p:nvSpPr>
+        <p:spPr/>
+        <p:txBody>
+          <a:bodyPr/>
+          <a:lstStyle/>
+          <a:p>
+            <a:r>
+              <a:rPr lang="en-US" dirty="0"/>
+              <a:t>New Visual Studio Code tools for Docker Containers</a:t>
+            </a:r>
+          </a:p>
+        </p:txBody>
+      </p:sp>
+      <p:sp>
+        <p:nvSpPr>
+          <p:cNvPr id="3" name="Text Placeholder 2">
+            <a:extLst>
+              <a:ext uri="{FF2B5EF4-FFF2-40B4-BE49-F238E27FC236}">
+                <a16:creationId xmlns:a16="http://schemas.microsoft.com/office/drawing/2014/main" id="{D6D0FF0F-C6D8-4915-B25F-91F24C8BE0D5}"/>
+              </a:ext>
+            </a:extLst>
+          </p:cNvPr>
+          <p:cNvSpPr>
+            <a:spLocks noGrp="1"/>
+          </p:cNvSpPr>
+          <p:nvPr>
+            <p:ph type="body" sz="quarter" idx="10"/>
+          </p:nvPr>
+        </p:nvSpPr>
+        <p:spPr>
+          <a:xfrm>
+            <a:off x="586390" y="1434370"/>
+            <a:ext cx="11018520" cy="1834348"/>
+          </a:xfrm>
+        </p:spPr>
+        <p:txBody>
+          <a:bodyPr/>
+          <a:lstStyle/>
+          <a:p>
+            <a:pPr marL="457200" indent="-457200">
+              <a:buFont typeface="Arial" panose="020B0604020202020204" pitchFamily="34" charset="0"/>
+              <a:buChar char="•"/>
+            </a:pPr>
+            <a:r>
+              <a:rPr lang="en-US" dirty="0"/>
+              <a:t>Command palette for adding docker support and pushing to ACR</a:t>
+            </a:r>
+          </a:p>
+          <a:p>
+            <a:pPr marL="457200" indent="-457200">
+              <a:buFont typeface="Arial" panose="020B0604020202020204" pitchFamily="34" charset="0"/>
+              <a:buChar char="•"/>
+            </a:pPr>
+            <a:r>
+              <a:rPr lang="en-US" dirty="0"/>
+              <a:t>Inspect environment variables, ports, and files; remote shell</a:t>
+            </a:r>
+          </a:p>
+          <a:p>
+            <a:pPr marL="457200" indent="-457200">
+              <a:buFont typeface="Arial" panose="020B0604020202020204" pitchFamily="34" charset="0"/>
+              <a:buChar char="•"/>
+            </a:pPr>
+            <a:r>
+              <a:rPr lang="en-US" dirty="0"/>
+              <a:t>New: build </a:t>
+            </a:r>
+            <a:r>
+              <a:rPr lang="en-US" dirty="0" err="1"/>
+              <a:t>Dockerfiles</a:t>
+            </a:r>
+            <a:r>
+              <a:rPr lang="en-US" dirty="0"/>
+              <a:t> for single containers and run easily</a:t>
+            </a:r>
+          </a:p>
+          <a:p>
+            <a:pPr marL="685800" lvl="1" indent="-457200">
+              <a:buFont typeface="Arial" panose="020B0604020202020204" pitchFamily="34" charset="0"/>
+              <a:buChar char="•"/>
+            </a:pPr>
+            <a:r>
+              <a:rPr lang="en-US" dirty="0"/>
+              <a:t>But still Compose using Add Orchestration</a:t>
+            </a:r>
+          </a:p>
+        </p:txBody>
+      </p:sp>
+      <p:pic>
+        <p:nvPicPr>
+          <p:cNvPr id="2050" name="Picture 2" descr="commands">
+            <a:extLst>
+              <a:ext uri="{FF2B5EF4-FFF2-40B4-BE49-F238E27FC236}">
+                <a16:creationId xmlns:a16="http://schemas.microsoft.com/office/drawing/2014/main" id="{382CD4EC-CD35-404B-BFAD-89E7946D7ACD}"/>
+              </a:ext>
+            </a:extLst>
+          </p:cNvPr>
+          <p:cNvPicPr>
+            <a:picLocks noChangeAspect="1" noChangeArrowheads="1"/>
+          </p:cNvPicPr>
+          <p:nvPr/>
+        </p:nvPicPr>
+        <p:blipFill>
+          <a:blip r:embed="rId2">
+            <a:extLst>
+              <a:ext uri="{28A0092B-C50C-407E-A947-70E740481C1C}">
+                <a14:useLocalDpi xmlns:a14="http://schemas.microsoft.com/office/drawing/2010/main" val="0"/>
+              </a:ext>
+            </a:extLst>
+          </a:blip>
+          <a:srcRect/>
+          <a:stretch>
+            <a:fillRect/>
+          </a:stretch>
+        </p:blipFill>
+        <p:spPr bwMode="auto">
+          <a:xfrm>
+            <a:off x="1975774" y="3589283"/>
+            <a:ext cx="7800975" cy="2676525"/>
+          </a:xfrm>
+          <a:prstGeom prst="rect">
+            <a:avLst/>
+          </a:prstGeom>
+          <a:noFill/>
+          <a:extLst>
+            <a:ext uri="{909E8E84-426E-40DD-AFC4-6F175D3DCCD1}">
+              <a14:hiddenFill xmlns:a14="http://schemas.microsoft.com/office/drawing/2010/main">
+                <a:solidFill>
+                  <a:srgbClr val="FFFFFF"/>
+                </a:solidFill>
+              </a14:hiddenFill>
+            </a:ext>
+          </a:extLst>
+        </p:spPr>
+      </p:pic>
+    </p:spTree>
+    <p:extLst>
+      <p:ext uri="{BB962C8B-B14F-4D97-AF65-F5344CB8AC3E}">
+        <p14:creationId xmlns:p14="http://schemas.microsoft.com/office/powerpoint/2010/main" val="221738380"/>
+      </p:ext>
+    </p:extLst>
+  </p:cSld>
+  <p:clrMapOvr>
+    <a:masterClrMapping/>
+  </p:clrMapOvr>
+  <p:transition>
+    <p:fade/>
+  </p:transition>
+</p:sld>
+</file>
+
+<file path=ppt/slides/slide8.xml><?xml version="1.0" encoding="utf-8"?>
+<p:sld xmlns:a="http://schemas.openxmlformats.org/drawingml/2006/main" xmlns:r="http://schemas.openxmlformats.org/officeDocument/2006/relationships" xmlns:p="http://schemas.openxmlformats.org/presentationml/2006/main">
+  <p:cSld>
+    <p:spTree>
+      <p:nvGrpSpPr>
+        <p:cNvPr id="1" name=""/>
+        <p:cNvGrpSpPr/>
+        <p:nvPr/>
+      </p:nvGrpSpPr>
+      <p:grpSpPr>
+        <a:xfrm>
+          <a:off x="0" y="0"/>
+          <a:ext cx="0" cy="0"/>
+          <a:chOff x="0" y="0"/>
+          <a:chExt cx="0" cy="0"/>
+        </a:xfrm>
+      </p:grpSpPr>
+      <p:sp>
+        <p:nvSpPr>
+          <p:cNvPr id="2" name="Title 1">
+            <a:extLst>
+              <a:ext uri="{FF2B5EF4-FFF2-40B4-BE49-F238E27FC236}">
+                <a16:creationId xmlns:a16="http://schemas.microsoft.com/office/drawing/2014/main" id="{41DD7C94-0AAD-4640-ACA5-6E1D9D4A4350}"/>
+              </a:ext>
+            </a:extLst>
+          </p:cNvPr>
+          <p:cNvSpPr>
+            <a:spLocks noGrp="1"/>
+          </p:cNvSpPr>
+          <p:nvPr>
+            <p:ph type="title"/>
+          </p:nvPr>
+        </p:nvSpPr>
+        <p:spPr/>
+        <p:txBody>
+          <a:bodyPr/>
+          <a:lstStyle/>
+          <a:p>
+            <a:r>
+              <a:rPr lang="en-US" dirty="0"/>
+              <a:t>Kubernetes Tools</a:t>
+            </a:r>
+          </a:p>
+        </p:txBody>
+      </p:sp>
+      <p:sp>
+        <p:nvSpPr>
+          <p:cNvPr id="3" name="Text Placeholder 2">
+            <a:extLst>
+              <a:ext uri="{FF2B5EF4-FFF2-40B4-BE49-F238E27FC236}">
+                <a16:creationId xmlns:a16="http://schemas.microsoft.com/office/drawing/2014/main" id="{C0DC7648-647B-4819-B573-7C2BADD22944}"/>
+              </a:ext>
+            </a:extLst>
+          </p:cNvPr>
+          <p:cNvSpPr>
+            <a:spLocks noGrp="1"/>
+          </p:cNvSpPr>
+          <p:nvPr>
+            <p:ph type="body" sz="quarter" idx="10"/>
+          </p:nvPr>
+        </p:nvSpPr>
+        <p:spPr>
+          <a:xfrm>
+            <a:off x="586390" y="1434370"/>
+            <a:ext cx="11018520" cy="5687711"/>
+          </a:xfrm>
+        </p:spPr>
+        <p:txBody>
+          <a:bodyPr/>
+          <a:lstStyle/>
+          <a:p>
+            <a:pPr marL="457200" indent="-457200">
+              <a:buFont typeface="Arial" panose="020B0604020202020204" pitchFamily="34" charset="0"/>
+              <a:buChar char="•"/>
+            </a:pPr>
+            <a:r>
+              <a:rPr lang="en-US" dirty="0"/>
+              <a:t>Helps DevOps and </a:t>
+            </a:r>
+            <a:r>
+              <a:rPr lang="en-US" dirty="0" err="1"/>
+              <a:t>Devs</a:t>
+            </a:r>
+            <a:r>
+              <a:rPr lang="en-US" dirty="0"/>
+              <a:t> build distributed orchestrated apps</a:t>
+            </a:r>
+          </a:p>
+          <a:p>
+            <a:pPr marL="457200" indent="-457200">
+              <a:buFont typeface="Arial" panose="020B0604020202020204" pitchFamily="34" charset="0"/>
+              <a:buChar char="•"/>
+            </a:pPr>
+            <a:r>
+              <a:rPr lang="en-US" dirty="0"/>
+              <a:t>Scaffold and edit common assets: </a:t>
+            </a:r>
+            <a:r>
+              <a:rPr lang="en-US" dirty="0" err="1"/>
+              <a:t>Yaml</a:t>
+            </a:r>
+            <a:r>
+              <a:rPr lang="en-US" dirty="0"/>
+              <a:t> manifests, Helm</a:t>
+            </a:r>
+          </a:p>
+          <a:p>
+            <a:pPr marL="457200" indent="-457200">
+              <a:buFont typeface="Arial" panose="020B0604020202020204" pitchFamily="34" charset="0"/>
+              <a:buChar char="•"/>
+            </a:pPr>
+            <a:r>
+              <a:rPr lang="en-US" dirty="0"/>
+              <a:t>Azure Dev Spaces to make building, testing and debugging services in large cloud distributed apps easier</a:t>
+            </a:r>
+          </a:p>
+          <a:p>
+            <a:endParaRPr lang="en-US" dirty="0"/>
+          </a:p>
+          <a:p>
+            <a:r>
+              <a:rPr lang="en-US" dirty="0"/>
+              <a:t>Visual Studio: </a:t>
+            </a:r>
+            <a:r>
+              <a:rPr lang="en-US" dirty="0">
+                <a:hlinkClick r:id="rId2"/>
+              </a:rPr>
+              <a:t>https://marketplace.visualstudio.com/items?itemName=ms-azuretools.vs-tools-for-kubernetes</a:t>
+            </a:r>
+            <a:endParaRPr lang="en-US" dirty="0"/>
+          </a:p>
+          <a:p>
+            <a:r>
+              <a:rPr lang="en-US" dirty="0"/>
+              <a:t>Visual Studio Code: </a:t>
+            </a:r>
+            <a:r>
+              <a:rPr lang="en-US" dirty="0">
+                <a:hlinkClick r:id="rId3"/>
+              </a:rPr>
+              <a:t>https://marketplace.visualstudio.com/items?itemName=ms-kubernetes-tools.vscode-kubernetes-tools</a:t>
+            </a:r>
+            <a:endParaRPr lang="en-US" dirty="0"/>
+          </a:p>
+          <a:p>
+            <a:endParaRPr lang="en-US" dirty="0"/>
+          </a:p>
+        </p:txBody>
+      </p:sp>
+    </p:spTree>
+    <p:extLst>
+      <p:ext uri="{BB962C8B-B14F-4D97-AF65-F5344CB8AC3E}">
+        <p14:creationId xmlns:p14="http://schemas.microsoft.com/office/powerpoint/2010/main" val="1694401310"/>
+      </p:ext>
+    </p:extLst>
+  </p:cSld>
+  <p:clrMapOvr>
+    <a:masterClrMapping/>
+  </p:clrMapOvr>
+  <p:transition>
+    <p:fade/>
+  </p:transition>
+</p:sld>
+</file>
+
+<file path=ppt/slides/slide9.xml><?xml version="1.0" encoding="utf-8"?>
 <p:sld xmlns:a="http://schemas.openxmlformats.org/drawingml/2006/main" xmlns:r="http://schemas.openxmlformats.org/officeDocument/2006/relationships" xmlns:p="http://schemas.openxmlformats.org/presentationml/2006/main" show="0">
   <p:cSld>
     <p:spTree>
@@ -22592,265 +23395,6 @@
     <p:extLst>
       <p:ext uri="{BB962C8B-B14F-4D97-AF65-F5344CB8AC3E}">
         <p14:creationId xmlns:p14="http://schemas.microsoft.com/office/powerpoint/2010/main" val="988072610"/>
-      </p:ext>
-    </p:extLst>
-  </p:cSld>
-  <p:clrMapOvr>
-    <a:masterClrMapping/>
-  </p:clrMapOvr>
-  <mc:AlternateContent xmlns:mc="http://schemas.openxmlformats.org/markup-compatibility/2006" xmlns:p14="http://schemas.microsoft.com/office/powerpoint/2010/main">
-    <mc:Choice Requires="p14">
-      <p:transition spd="med" p14:dur="700">
-        <p:fade/>
-      </p:transition>
-    </mc:Choice>
-    <mc:Fallback xmlns="">
-      <p:transition spd="med">
-        <p:fade/>
-      </p:transition>
-    </mc:Fallback>
-  </mc:AlternateContent>
-</p:sld>
-</file>
-
-<file path=ppt/slides/slide7.xml><?xml version="1.0" encoding="utf-8"?>
-<p:sld xmlns:a="http://schemas.openxmlformats.org/drawingml/2006/main" xmlns:r="http://schemas.openxmlformats.org/officeDocument/2006/relationships" xmlns:p="http://schemas.openxmlformats.org/presentationml/2006/main">
-  <p:cSld>
-    <p:spTree>
-      <p:nvGrpSpPr>
-        <p:cNvPr id="1" name=""/>
-        <p:cNvGrpSpPr/>
-        <p:nvPr/>
-      </p:nvGrpSpPr>
-      <p:grpSpPr>
-        <a:xfrm>
-          <a:off x="0" y="0"/>
-          <a:ext cx="0" cy="0"/>
-          <a:chOff x="0" y="0"/>
-          <a:chExt cx="0" cy="0"/>
-        </a:xfrm>
-      </p:grpSpPr>
-      <p:sp>
-        <p:nvSpPr>
-          <p:cNvPr id="3" name="Title 2"/>
-          <p:cNvSpPr>
-            <a:spLocks noGrp="1"/>
-          </p:cNvSpPr>
-          <p:nvPr>
-            <p:ph type="title"/>
-          </p:nvPr>
-        </p:nvSpPr>
-        <p:spPr/>
-        <p:txBody>
-          <a:bodyPr/>
-          <a:lstStyle/>
-          <a:p>
-            <a:r>
-              <a:rPr lang="en-US" dirty="0"/>
-              <a:t>Demo</a:t>
-            </a:r>
-          </a:p>
-        </p:txBody>
-      </p:sp>
-      <p:sp>
-        <p:nvSpPr>
-          <p:cNvPr id="4" name="Text Placeholder 3"/>
-          <p:cNvSpPr>
-            <a:spLocks noGrp="1"/>
-          </p:cNvSpPr>
-          <p:nvPr>
-            <p:ph type="body" sz="quarter" idx="12"/>
-          </p:nvPr>
-        </p:nvSpPr>
-        <p:spPr/>
-        <p:txBody>
-          <a:bodyPr/>
-          <a:lstStyle/>
-          <a:p>
-            <a:r>
-              <a:rPr lang="en-US" dirty="0"/>
-              <a:t>Paul Yuknewicz</a:t>
-            </a:r>
-          </a:p>
-        </p:txBody>
-      </p:sp>
-    </p:spTree>
-    <p:extLst>
-      <p:ext uri="{BB962C8B-B14F-4D97-AF65-F5344CB8AC3E}">
-        <p14:creationId xmlns:p14="http://schemas.microsoft.com/office/powerpoint/2010/main" val="203203085"/>
-      </p:ext>
-    </p:extLst>
-  </p:cSld>
-  <p:clrMapOvr>
-    <a:masterClrMapping/>
-  </p:clrMapOvr>
-  <mc:AlternateContent xmlns:mc="http://schemas.openxmlformats.org/markup-compatibility/2006" xmlns:p14="http://schemas.microsoft.com/office/powerpoint/2010/main">
-    <mc:Choice Requires="p14">
-      <p:transition spd="med" p14:dur="700">
-        <p:fade/>
-      </p:transition>
-    </mc:Choice>
-    <mc:Fallback xmlns="">
-      <p:transition spd="med">
-        <p:fade/>
-      </p:transition>
-    </mc:Fallback>
-  </mc:AlternateContent>
-</p:sld>
-</file>
-
-<file path=ppt/slides/slide8.xml><?xml version="1.0" encoding="utf-8"?>
-<p:sld xmlns:a="http://schemas.openxmlformats.org/drawingml/2006/main" xmlns:r="http://schemas.openxmlformats.org/officeDocument/2006/relationships" xmlns:p="http://schemas.openxmlformats.org/presentationml/2006/main">
-  <p:cSld>
-    <p:spTree>
-      <p:nvGrpSpPr>
-        <p:cNvPr id="1" name=""/>
-        <p:cNvGrpSpPr/>
-        <p:nvPr/>
-      </p:nvGrpSpPr>
-      <p:grpSpPr>
-        <a:xfrm>
-          <a:off x="0" y="0"/>
-          <a:ext cx="0" cy="0"/>
-          <a:chOff x="0" y="0"/>
-          <a:chExt cx="0" cy="0"/>
-        </a:xfrm>
-      </p:grpSpPr>
-      <p:sp>
-        <p:nvSpPr>
-          <p:cNvPr id="2" name="Title 1"/>
-          <p:cNvSpPr>
-            <a:spLocks noGrp="1"/>
-          </p:cNvSpPr>
-          <p:nvPr>
-            <p:ph type="title"/>
-          </p:nvPr>
-        </p:nvSpPr>
-        <p:spPr>
-          <a:xfrm>
-            <a:off x="588263" y="457200"/>
-            <a:ext cx="11018520" cy="553998"/>
-          </a:xfrm>
-        </p:spPr>
-        <p:txBody>
-          <a:bodyPr/>
-          <a:lstStyle/>
-          <a:p>
-            <a:r>
-              <a:rPr lang="en-US" dirty="0"/>
-              <a:t>Summary</a:t>
-            </a:r>
-            <a:endParaRPr lang="en-US" sz="2000" dirty="0"/>
-          </a:p>
-        </p:txBody>
-      </p:sp>
-      <p:sp>
-        <p:nvSpPr>
-          <p:cNvPr id="3" name="Text Placeholder 2"/>
-          <p:cNvSpPr>
-            <a:spLocks noGrp="1"/>
-          </p:cNvSpPr>
-          <p:nvPr>
-            <p:ph type="body" sz="quarter" idx="10"/>
-          </p:nvPr>
-        </p:nvSpPr>
-        <p:spPr>
-          <a:xfrm>
-            <a:off x="590868" y="2023427"/>
-            <a:ext cx="6429364" cy="1661993"/>
-          </a:xfrm>
-        </p:spPr>
-        <p:txBody>
-          <a:bodyPr/>
-          <a:lstStyle/>
-          <a:p>
-            <a:pPr marL="571500" lvl="1" indent="-342900">
-              <a:buFont typeface="Arial" panose="020B0604020202020204" pitchFamily="34" charset="0"/>
-              <a:buChar char="•"/>
-            </a:pPr>
-            <a:r>
-              <a:rPr lang="en-US" dirty="0"/>
-              <a:t>Install Visual Studio 2019 with Web, Azure or Container workloads </a:t>
-            </a:r>
-          </a:p>
-          <a:p>
-            <a:pPr marL="571500" lvl="1" indent="-342900">
-              <a:buFont typeface="Arial" panose="020B0604020202020204" pitchFamily="34" charset="0"/>
-              <a:buChar char="•"/>
-            </a:pPr>
-            <a:r>
-              <a:rPr lang="en-US" dirty="0"/>
-              <a:t>Build and debug containers in VS</a:t>
-            </a:r>
-          </a:p>
-          <a:p>
-            <a:pPr marL="571500" lvl="1" indent="-342900">
-              <a:buFont typeface="Arial" panose="020B0604020202020204" pitchFamily="34" charset="0"/>
-              <a:buChar char="•"/>
-            </a:pPr>
-            <a:r>
-              <a:rPr lang="en-US" dirty="0"/>
-              <a:t>Learn more: </a:t>
-            </a:r>
-            <a:r>
-              <a:rPr lang="en-US" dirty="0">
-                <a:hlinkClick r:id="rId3"/>
-              </a:rPr>
-              <a:t>https://docs.microsoft.com/en-us/visualstudio/containers</a:t>
-            </a:r>
-            <a:r>
-              <a:rPr lang="en-US" dirty="0"/>
-              <a:t> </a:t>
-            </a:r>
-          </a:p>
-        </p:txBody>
-      </p:sp>
-    </p:spTree>
-    <p:extLst>
-      <p:ext uri="{BB962C8B-B14F-4D97-AF65-F5344CB8AC3E}">
-        <p14:creationId xmlns:p14="http://schemas.microsoft.com/office/powerpoint/2010/main" val="2968522231"/>
-      </p:ext>
-    </p:extLst>
-  </p:cSld>
-  <p:clrMapOvr>
-    <a:masterClrMapping/>
-  </p:clrMapOvr>
-  <mc:AlternateContent xmlns:mc="http://schemas.openxmlformats.org/markup-compatibility/2006" xmlns:p14="http://schemas.microsoft.com/office/powerpoint/2010/main">
-    <mc:Choice Requires="p14">
-      <p:transition spd="med" p14:dur="700">
-        <p:fade/>
-      </p:transition>
-    </mc:Choice>
-    <mc:Fallback xmlns="">
-      <p:transition spd="med">
-        <p:fade/>
-      </p:transition>
-    </mc:Fallback>
-  </mc:AlternateContent>
-</p:sld>
-</file>
-
-<file path=ppt/slides/slide9.xml><?xml version="1.0" encoding="utf-8"?>
-<p:sld xmlns:a="http://schemas.openxmlformats.org/drawingml/2006/main" xmlns:r="http://schemas.openxmlformats.org/officeDocument/2006/relationships" xmlns:p="http://schemas.openxmlformats.org/presentationml/2006/main">
-  <p:cSld>
-    <p:spTree>
-      <p:nvGrpSpPr>
-        <p:cNvPr id="1" name=""/>
-        <p:cNvGrpSpPr/>
-        <p:nvPr/>
-      </p:nvGrpSpPr>
-      <p:grpSpPr>
-        <a:xfrm>
-          <a:off x="0" y="0"/>
-          <a:ext cx="0" cy="0"/>
-          <a:chOff x="0" y="0"/>
-          <a:chExt cx="0" cy="0"/>
-        </a:xfrm>
-      </p:grpSpPr>
-    </p:spTree>
-    <p:extLst>
-      <p:ext uri="{BB962C8B-B14F-4D97-AF65-F5344CB8AC3E}">
-        <p14:creationId xmlns:p14="http://schemas.microsoft.com/office/powerpoint/2010/main" val="2402828649"/>
       </p:ext>
     </p:extLst>
   </p:cSld>
@@ -24034,12 +24578,6 @@
 </file>
 
 <file path=customXml/item2.xml><?xml version="1.0" encoding="utf-8"?>
-<p:properties xmlns:p="http://schemas.microsoft.com/office/2006/metadata/properties" xmlns:xsi="http://www.w3.org/2001/XMLSchema-instance" xmlns:pc="http://schemas.microsoft.com/office/infopath/2007/PartnerControls">
-  <documentManagement/>
-</p:properties>
-</file>
-
-<file path=customXml/item3.xml><?xml version="1.0" encoding="utf-8"?>
 <ct:contentTypeSchema xmlns:ct="http://schemas.microsoft.com/office/2006/metadata/contentType" xmlns:ma="http://schemas.microsoft.com/office/2006/metadata/properties/metaAttributes" ct:_="" ma:_="" ma:contentTypeName="Document" ma:contentTypeID="0x010100BD9FAF4CD5AD2F4B99B5B2414089ABF7" ma:contentTypeVersion="12" ma:contentTypeDescription="Create a new document." ma:contentTypeScope="" ma:versionID="230db19e8b17ba2810ea93624333db7c">
   <xsd:schema xmlns:xsd="http://www.w3.org/2001/XMLSchema" xmlns:xs="http://www.w3.org/2001/XMLSchema" xmlns:p="http://schemas.microsoft.com/office/2006/metadata/properties" xmlns:ns2="dcf5ddc1-fb1d-440f-849a-6450bddbaed7" xmlns:ns3="965de625-df5b-42e9-a277-2113da4f1195" targetNamespace="http://schemas.microsoft.com/office/2006/metadata/properties" ma:root="true" ma:fieldsID="dca6bc5695fb6c44cc6989902b88d8c5" ns2:_="" ns3:_="">
     <xsd:import namespace="dcf5ddc1-fb1d-440f-849a-6450bddbaed7"/>
@@ -24256,6 +24794,12 @@
 </ct:contentTypeSchema>
 </file>
 
+<file path=customXml/item3.xml><?xml version="1.0" encoding="utf-8"?>
+<p:properties xmlns:p="http://schemas.microsoft.com/office/2006/metadata/properties" xmlns:xsi="http://www.w3.org/2001/XMLSchema-instance" xmlns:pc="http://schemas.microsoft.com/office/infopath/2007/PartnerControls">
+  <documentManagement/>
+</p:properties>
+</file>
+
 <file path=customXml/itemProps1.xml><?xml version="1.0" encoding="utf-8"?>
 <ds:datastoreItem xmlns:ds="http://schemas.openxmlformats.org/officeDocument/2006/customXml" ds:itemID="{758FDAC0-319D-4A54-8D8E-1D42CB1F8004}">
   <ds:schemaRefs>
@@ -24265,23 +24809,6 @@
 </file>
 
 <file path=customXml/itemProps2.xml><?xml version="1.0" encoding="utf-8"?>
-<ds:datastoreItem xmlns:ds="http://schemas.openxmlformats.org/officeDocument/2006/customXml" ds:itemID="{F990F116-B58F-4255-B05B-DA3808E0E5C6}">
-  <ds:schemaRefs>
-    <ds:schemaRef ds:uri="dcf5ddc1-fb1d-440f-849a-6450bddbaed7"/>
-    <ds:schemaRef ds:uri="http://purl.org/dc/terms/"/>
-    <ds:schemaRef ds:uri="http://schemas.openxmlformats.org/package/2006/metadata/core-properties"/>
-    <ds:schemaRef ds:uri="http://schemas.microsoft.com/office/2006/documentManagement/types"/>
-    <ds:schemaRef ds:uri="http://schemas.microsoft.com/office/infopath/2007/PartnerControls"/>
-    <ds:schemaRef ds:uri="http://purl.org/dc/elements/1.1/"/>
-    <ds:schemaRef ds:uri="http://schemas.microsoft.com/office/2006/metadata/properties"/>
-    <ds:schemaRef ds:uri="965de625-df5b-42e9-a277-2113da4f1195"/>
-    <ds:schemaRef ds:uri="http://www.w3.org/XML/1998/namespace"/>
-    <ds:schemaRef ds:uri="http://purl.org/dc/dcmitype/"/>
-  </ds:schemaRefs>
-</ds:datastoreItem>
-</file>
-
-<file path=customXml/itemProps3.xml><?xml version="1.0" encoding="utf-8"?>
 <ds:datastoreItem xmlns:ds="http://schemas.openxmlformats.org/officeDocument/2006/customXml" ds:itemID="{ACD8681F-3394-459F-BDB4-E6A41BDB1F22}">
   <ds:schemaRefs>
     <ds:schemaRef ds:uri="http://schemas.microsoft.com/office/2006/metadata/contentType"/>
@@ -24298,4 +24825,21 @@
     <ds:schemaRef ds:uri="http://schemas.microsoft.com/internal/obd"/>
   </ds:schemaRefs>
 </ds:datastoreItem>
+</file>
+
+<file path=customXml/itemProps3.xml><?xml version="1.0" encoding="utf-8"?>
+<ds:datastoreItem xmlns:ds="http://schemas.openxmlformats.org/officeDocument/2006/customXml" ds:itemID="{F990F116-B58F-4255-B05B-DA3808E0E5C6}">
+  <ds:schemaRefs>
+    <ds:schemaRef ds:uri="dcf5ddc1-fb1d-440f-849a-6450bddbaed7"/>
+    <ds:schemaRef ds:uri="http://purl.org/dc/terms/"/>
+    <ds:schemaRef ds:uri="http://schemas.openxmlformats.org/package/2006/metadata/core-properties"/>
+    <ds:schemaRef ds:uri="http://schemas.microsoft.com/office/2006/documentManagement/types"/>
+    <ds:schemaRef ds:uri="http://schemas.microsoft.com/office/infopath/2007/PartnerControls"/>
+    <ds:schemaRef ds:uri="http://purl.org/dc/elements/1.1/"/>
+    <ds:schemaRef ds:uri="http://schemas.microsoft.com/office/2006/metadata/properties"/>
+    <ds:schemaRef ds:uri="965de625-df5b-42e9-a277-2113da4f1195"/>
+    <ds:schemaRef ds:uri="http://www.w3.org/XML/1998/namespace"/>
+    <ds:schemaRef ds:uri="http://purl.org/dc/dcmitype/"/>
+  </ds:schemaRefs>
+</ds:datastoreItem>
 </file>
</xml_diff>